<commit_message>
Updated the general documentation (i.e. the website's homepage) by adding a PNG version of a shaded SVG version of our logo (Note: we don't use the SVG version itself because some browsers, e.g. Chrome, don't render it properly).
Now use a SVG version of our logo in TabWidget since it obviously scales much better than a raw image. Note that this means that we now need QtSvg when deploying OpenCOR. This has been dealt with for Windows, but still needs to be done for Linux and Mac OS X.
</commit_message>
<xml_diff>
--- a/src/plugins/misc/Core/res/Logo.pptx
+++ b/src/plugins/misc/Core/res/Logo.pptx
@@ -3289,15 +3289,6 @@
                 <a:solidFill>
                   <a:srgbClr val="EFEFEF"/>
                 </a:solidFill>
-                <a:effectLst>
-                  <a:outerShdw blurRad="50800" dist="40000" dir="5400000" algn="tl" rotWithShape="0">
-                    <a:srgbClr val="000000">
-                      <a:shade val="5000"/>
-                      <a:satMod val="120000"/>
-                      <a:alpha val="33000"/>
-                    </a:srgbClr>
-                  </a:outerShdw>
-                </a:effectLst>
                 <a:latin typeface="Brush Script MT" pitchFamily="66" charset="0"/>
               </a:rPr>
               <a:t>Open</a:t>
@@ -3313,15 +3304,6 @@
                 <a:solidFill>
                   <a:srgbClr val="DBDBEF"/>
                 </a:solidFill>
-                <a:effectLst>
-                  <a:outerShdw blurRad="50800" dist="40000" dir="5400000" algn="tl" rotWithShape="0">
-                    <a:srgbClr val="000000">
-                      <a:shade val="5000"/>
-                      <a:satMod val="120000"/>
-                      <a:alpha val="33000"/>
-                    </a:srgbClr>
-                  </a:outerShdw>
-                </a:effectLst>
                 <a:latin typeface="Brush Script MT" pitchFamily="66" charset="0"/>
               </a:rPr>
               <a:t>C</a:t>
@@ -3337,15 +3319,6 @@
                 <a:solidFill>
                   <a:srgbClr val="EFEFEF"/>
                 </a:solidFill>
-                <a:effectLst>
-                  <a:outerShdw blurRad="50800" dist="40000" dir="5400000" algn="tl" rotWithShape="0">
-                    <a:srgbClr val="000000">
-                      <a:shade val="5000"/>
-                      <a:satMod val="120000"/>
-                      <a:alpha val="33000"/>
-                    </a:srgbClr>
-                  </a:outerShdw>
-                </a:effectLst>
                 <a:latin typeface="Brush Script MT" pitchFamily="66" charset="0"/>
               </a:rPr>
               <a:t>O</a:t>
@@ -3361,15 +3334,6 @@
                 <a:solidFill>
                   <a:srgbClr val="EFDBDB"/>
                 </a:solidFill>
-                <a:effectLst>
-                  <a:outerShdw blurRad="50800" dist="40000" dir="5400000" algn="tl" rotWithShape="0">
-                    <a:srgbClr val="000000">
-                      <a:shade val="5000"/>
-                      <a:satMod val="120000"/>
-                      <a:alpha val="33000"/>
-                    </a:srgbClr>
-                  </a:outerShdw>
-                </a:effectLst>
                 <a:latin typeface="Brush Script MT" pitchFamily="66" charset="0"/>
               </a:rPr>
               <a:t>R</a:t>
@@ -3384,15 +3348,6 @@
               <a:solidFill>
                 <a:srgbClr val="EFDBDB"/>
               </a:solidFill>
-              <a:effectLst>
-                <a:outerShdw blurRad="50800" dist="40000" dir="5400000" algn="tl" rotWithShape="0">
-                  <a:srgbClr val="000000">
-                    <a:shade val="5000"/>
-                    <a:satMod val="120000"/>
-                    <a:alpha val="33000"/>
-                  </a:srgbClr>
-                </a:outerShdw>
-              </a:effectLst>
               <a:latin typeface="Brush Script MT" pitchFamily="66" charset="0"/>
             </a:endParaRPr>
           </a:p>

</xml_diff>

<commit_message>
Something I hadn't realised when it comes to SVG is that it's quite CPU intensive to render (not surprisingly I guess) and this is somewhat noticeable when resizing the main window which then resizes the central widget's tab widget and therefore re-renders the logo if there is no document opened. So, we are dropping the idea of SVG for this and reverting to a QPixmap which we don't resize when there is not enough space to see all of it (i.e. it doesn't look 'ugly' as it used to be when shrunk). In the end, I think we have a better solution, so that's good. We will, however, have to remove our dependency on SVG for now...
</commit_message>
<xml_diff>
--- a/src/plugins/misc/Core/res/Logo.pptx
+++ b/src/plugins/misc/Core/res/Logo.pptx
@@ -3219,7 +3219,7 @@
     <p:bg>
       <p:bgPr>
         <a:solidFill>
-          <a:srgbClr val="F9F9F9"/>
+          <a:schemeClr val="bg1"/>
         </a:solidFill>
         <a:effectLst/>
       </p:bgPr>
@@ -3280,7 +3280,7 @@
             <a:pPr algn="ctr"/>
             <a:r>
               <a:rPr lang="en-US" sz="9600" b="1" dirty="0" smtClean="0">
-                <a:ln w="31550" cmpd="sng">
+                <a:ln w="19050" cmpd="sng">
                   <a:solidFill>
                     <a:srgbClr val="454545"/>
                   </a:solidFill>
@@ -3289,13 +3289,42 @@
                 <a:solidFill>
                   <a:srgbClr val="EFEFEF"/>
                 </a:solidFill>
+                <a:effectLst>
+                  <a:outerShdw blurRad="38100" dist="38100" dir="2700000" algn="tl">
+                    <a:srgbClr val="000000">
+                      <a:alpha val="43137"/>
+                    </a:srgbClr>
+                  </a:outerShdw>
+                </a:effectLst>
                 <a:latin typeface="Brush Script MT" pitchFamily="66" charset="0"/>
               </a:rPr>
               <a:t>Open</a:t>
             </a:r>
             <a:r>
+              <a:rPr lang="en-US" sz="2800" b="1" dirty="0" smtClean="0">
+                <a:ln w="19050" cmpd="sng">
+                  <a:solidFill>
+                    <a:srgbClr val="454545"/>
+                  </a:solidFill>
+                  <a:prstDash val="solid"/>
+                </a:ln>
+                <a:solidFill>
+                  <a:srgbClr val="EFEFEF"/>
+                </a:solidFill>
+                <a:effectLst>
+                  <a:outerShdw blurRad="38100" dist="38100" dir="2700000" algn="tl">
+                    <a:srgbClr val="000000">
+                      <a:alpha val="43137"/>
+                    </a:srgbClr>
+                  </a:outerShdw>
+                </a:effectLst>
+                <a:latin typeface="Brush Script MT" pitchFamily="66" charset="0"/>
+              </a:rPr>
+              <a:t> </a:t>
+            </a:r>
+            <a:r>
               <a:rPr lang="en-US" sz="9600" b="1" dirty="0" smtClean="0">
-                <a:ln w="31550" cmpd="sng">
+                <a:ln w="38100" cmpd="sng">
                   <a:solidFill>
                     <a:srgbClr val="000045"/>
                   </a:solidFill>
@@ -3304,13 +3333,20 @@
                 <a:solidFill>
                   <a:srgbClr val="DBDBEF"/>
                 </a:solidFill>
+                <a:effectLst>
+                  <a:outerShdw blurRad="38100" dist="38100" dir="2700000" algn="tl">
+                    <a:srgbClr val="000000">
+                      <a:alpha val="43137"/>
+                    </a:srgbClr>
+                  </a:outerShdw>
+                </a:effectLst>
                 <a:latin typeface="Brush Script MT" pitchFamily="66" charset="0"/>
               </a:rPr>
               <a:t>C</a:t>
             </a:r>
             <a:r>
-              <a:rPr lang="en-US" sz="9600" b="1" dirty="0" smtClean="0">
-                <a:ln w="31550" cmpd="sng">
+              <a:rPr lang="en-US" sz="2800" b="1" dirty="0">
+                <a:ln w="19050" cmpd="sng">
                   <a:solidFill>
                     <a:srgbClr val="454545"/>
                   </a:solidFill>
@@ -3319,13 +3355,42 @@
                 <a:solidFill>
                   <a:srgbClr val="EFEFEF"/>
                 </a:solidFill>
+                <a:effectLst>
+                  <a:outerShdw blurRad="38100" dist="38100" dir="2700000" algn="tl">
+                    <a:srgbClr val="000000">
+                      <a:alpha val="43137"/>
+                    </a:srgbClr>
+                  </a:outerShdw>
+                </a:effectLst>
+                <a:latin typeface="Brush Script MT" pitchFamily="66" charset="0"/>
+              </a:rPr>
+              <a:t> </a:t>
+            </a:r>
+            <a:r>
+              <a:rPr lang="en-US" sz="9600" b="1" dirty="0" smtClean="0">
+                <a:ln w="38100" cmpd="sng">
+                  <a:solidFill>
+                    <a:srgbClr val="454545"/>
+                  </a:solidFill>
+                  <a:prstDash val="solid"/>
+                </a:ln>
+                <a:solidFill>
+                  <a:srgbClr val="EFEFEF"/>
+                </a:solidFill>
+                <a:effectLst>
+                  <a:outerShdw blurRad="38100" dist="38100" dir="2700000" algn="tl">
+                    <a:srgbClr val="000000">
+                      <a:alpha val="43137"/>
+                    </a:srgbClr>
+                  </a:outerShdw>
+                </a:effectLst>
                 <a:latin typeface="Brush Script MT" pitchFamily="66" charset="0"/>
               </a:rPr>
               <a:t>O</a:t>
             </a:r>
             <a:r>
               <a:rPr lang="en-US" sz="9600" b="1" dirty="0" smtClean="0">
-                <a:ln w="31550" cmpd="sng">
+                <a:ln w="38100" cmpd="sng">
                   <a:solidFill>
                     <a:srgbClr val="450000"/>
                   </a:solidFill>
@@ -3334,12 +3399,19 @@
                 <a:solidFill>
                   <a:srgbClr val="EFDBDB"/>
                 </a:solidFill>
+                <a:effectLst>
+                  <a:outerShdw blurRad="38100" dist="38100" dir="2700000" algn="tl">
+                    <a:srgbClr val="000000">
+                      <a:alpha val="43137"/>
+                    </a:srgbClr>
+                  </a:outerShdw>
+                </a:effectLst>
                 <a:latin typeface="Brush Script MT" pitchFamily="66" charset="0"/>
               </a:rPr>
               <a:t>R</a:t>
             </a:r>
             <a:endParaRPr lang="en-US" sz="9600" b="1" dirty="0">
-              <a:ln w="31550" cmpd="sng">
+              <a:ln w="38100" cmpd="sng">
                 <a:solidFill>
                   <a:srgbClr val="450000"/>
                 </a:solidFill>
@@ -3348,6 +3420,13 @@
               <a:solidFill>
                 <a:srgbClr val="EFDBDB"/>
               </a:solidFill>
+              <a:effectLst>
+                <a:outerShdw blurRad="38100" dist="38100" dir="2700000" algn="tl">
+                  <a:srgbClr val="000000">
+                    <a:alpha val="43137"/>
+                  </a:srgbClr>
+                </a:outerShdw>
+              </a:effectLst>
               <a:latin typeface="Brush Script MT" pitchFamily="66" charset="0"/>
             </a:endParaRPr>
           </a:p>

</xml_diff>